<commit_message>
Add contribute button and remove logo from background
</commit_message>
<xml_diff>
--- a/GitHub.pptx
+++ b/GitHub.pptx
@@ -6,6 +6,8 @@
   </p:sldMasterIdLst>
   <p:sldIdLst>
     <p:sldId id="256" r:id="rId2"/>
+    <p:sldId id="257" r:id="rId3"/>
+    <p:sldId id="258" r:id="rId4"/>
   </p:sldIdLst>
   <p:sldSz cx="12192000" cy="6858000"/>
   <p:notesSz cx="6858000" cy="9144000"/>
@@ -104,6 +106,11 @@
       </a:defRPr>
     </a:lvl9pPr>
   </p:defaultTextStyle>
+  <p:extLst>
+    <p:ext uri="{EFAFB233-063F-42B5-8137-9DF3F51BA10A}">
+      <p15:sldGuideLst xmlns:p15="http://schemas.microsoft.com/office/powerpoint/2012/main"/>
+    </p:ext>
+  </p:extLst>
 </p:presentation>
 </file>
 
@@ -256,7 +263,7 @@
           <a:p>
             <a:fld id="{5BA84F21-6EC4-4D02-8610-BF815856B110}" type="datetimeFigureOut">
               <a:rPr lang="en-NL" smtClean="0"/>
-              <a:t>20/02/2022</a:t>
+              <a:t>07/02/2023</a:t>
             </a:fld>
             <a:endParaRPr lang="en-NL"/>
           </a:p>
@@ -456,7 +463,7 @@
           <a:p>
             <a:fld id="{5BA84F21-6EC4-4D02-8610-BF815856B110}" type="datetimeFigureOut">
               <a:rPr lang="en-NL" smtClean="0"/>
-              <a:t>20/02/2022</a:t>
+              <a:t>07/02/2023</a:t>
             </a:fld>
             <a:endParaRPr lang="en-NL"/>
           </a:p>
@@ -666,7 +673,7 @@
           <a:p>
             <a:fld id="{5BA84F21-6EC4-4D02-8610-BF815856B110}" type="datetimeFigureOut">
               <a:rPr lang="en-NL" smtClean="0"/>
-              <a:t>20/02/2022</a:t>
+              <a:t>07/02/2023</a:t>
             </a:fld>
             <a:endParaRPr lang="en-NL"/>
           </a:p>
@@ -866,7 +873,7 @@
           <a:p>
             <a:fld id="{5BA84F21-6EC4-4D02-8610-BF815856B110}" type="datetimeFigureOut">
               <a:rPr lang="en-NL" smtClean="0"/>
-              <a:t>20/02/2022</a:t>
+              <a:t>07/02/2023</a:t>
             </a:fld>
             <a:endParaRPr lang="en-NL"/>
           </a:p>
@@ -1142,7 +1149,7 @@
           <a:p>
             <a:fld id="{5BA84F21-6EC4-4D02-8610-BF815856B110}" type="datetimeFigureOut">
               <a:rPr lang="en-NL" smtClean="0"/>
-              <a:t>20/02/2022</a:t>
+              <a:t>07/02/2023</a:t>
             </a:fld>
             <a:endParaRPr lang="en-NL"/>
           </a:p>
@@ -1410,7 +1417,7 @@
           <a:p>
             <a:fld id="{5BA84F21-6EC4-4D02-8610-BF815856B110}" type="datetimeFigureOut">
               <a:rPr lang="en-NL" smtClean="0"/>
-              <a:t>20/02/2022</a:t>
+              <a:t>07/02/2023</a:t>
             </a:fld>
             <a:endParaRPr lang="en-NL"/>
           </a:p>
@@ -1825,7 +1832,7 @@
           <a:p>
             <a:fld id="{5BA84F21-6EC4-4D02-8610-BF815856B110}" type="datetimeFigureOut">
               <a:rPr lang="en-NL" smtClean="0"/>
-              <a:t>20/02/2022</a:t>
+              <a:t>07/02/2023</a:t>
             </a:fld>
             <a:endParaRPr lang="en-NL"/>
           </a:p>
@@ -1967,7 +1974,7 @@
           <a:p>
             <a:fld id="{5BA84F21-6EC4-4D02-8610-BF815856B110}" type="datetimeFigureOut">
               <a:rPr lang="en-NL" smtClean="0"/>
-              <a:t>20/02/2022</a:t>
+              <a:t>07/02/2023</a:t>
             </a:fld>
             <a:endParaRPr lang="en-NL"/>
           </a:p>
@@ -2080,7 +2087,7 @@
           <a:p>
             <a:fld id="{5BA84F21-6EC4-4D02-8610-BF815856B110}" type="datetimeFigureOut">
               <a:rPr lang="en-NL" smtClean="0"/>
-              <a:t>20/02/2022</a:t>
+              <a:t>07/02/2023</a:t>
             </a:fld>
             <a:endParaRPr lang="en-NL"/>
           </a:p>
@@ -2393,7 +2400,7 @@
           <a:p>
             <a:fld id="{5BA84F21-6EC4-4D02-8610-BF815856B110}" type="datetimeFigureOut">
               <a:rPr lang="en-NL" smtClean="0"/>
-              <a:t>20/02/2022</a:t>
+              <a:t>07/02/2023</a:t>
             </a:fld>
             <a:endParaRPr lang="en-NL"/>
           </a:p>
@@ -2682,7 +2689,7 @@
           <a:p>
             <a:fld id="{5BA84F21-6EC4-4D02-8610-BF815856B110}" type="datetimeFigureOut">
               <a:rPr lang="en-NL" smtClean="0"/>
-              <a:t>20/02/2022</a:t>
+              <a:t>07/02/2023</a:t>
             </a:fld>
             <a:endParaRPr lang="en-NL"/>
           </a:p>
@@ -2925,7 +2932,7 @@
           <a:p>
             <a:fld id="{5BA84F21-6EC4-4D02-8610-BF815856B110}" type="datetimeFigureOut">
               <a:rPr lang="en-NL" smtClean="0"/>
-              <a:t>20/02/2022</a:t>
+              <a:t>07/02/2023</a:t>
             </a:fld>
             <a:endParaRPr lang="en-NL"/>
           </a:p>
@@ -3595,6 +3602,405 @@
 </p:sld>
 </file>
 
+<file path=ppt/slides/slide2.xml><?xml version="1.0" encoding="utf-8"?>
+<p:sld xmlns:a="http://schemas.openxmlformats.org/drawingml/2006/main" xmlns:r="http://schemas.openxmlformats.org/officeDocument/2006/relationships" xmlns:p="http://schemas.openxmlformats.org/presentationml/2006/main">
+  <p:cSld>
+    <p:bg>
+      <p:bgPr>
+        <a:solidFill>
+          <a:schemeClr val="tx1"/>
+        </a:solidFill>
+        <a:effectLst/>
+      </p:bgPr>
+    </p:bg>
+    <p:spTree>
+      <p:nvGrpSpPr>
+        <p:cNvPr id="1" name=""/>
+        <p:cNvGrpSpPr/>
+        <p:nvPr/>
+      </p:nvGrpSpPr>
+      <p:grpSpPr>
+        <a:xfrm>
+          <a:off x="0" y="0"/>
+          <a:ext cx="0" cy="0"/>
+          <a:chOff x="0" y="0"/>
+          <a:chExt cx="0" cy="0"/>
+        </a:xfrm>
+      </p:grpSpPr>
+      <p:pic>
+        <p:nvPicPr>
+          <p:cNvPr id="5" name="Picture 4" descr="A cup of coffee&#10;&#10;Description automatically generated with medium confidence">
+            <a:extLst>
+              <a:ext uri="{FF2B5EF4-FFF2-40B4-BE49-F238E27FC236}">
+                <a16:creationId xmlns:a16="http://schemas.microsoft.com/office/drawing/2014/main" id="{7AEFEE42-4C03-433B-A7D3-A8D5CBC144C1}"/>
+              </a:ext>
+            </a:extLst>
+          </p:cNvPr>
+          <p:cNvPicPr>
+            <a:picLocks noChangeAspect="1"/>
+          </p:cNvPicPr>
+          <p:nvPr/>
+        </p:nvPicPr>
+        <p:blipFill>
+          <a:blip r:embed="rId2">
+            <a:extLst>
+              <a:ext uri="{28A0092B-C50C-407E-A947-70E740481C1C}">
+                <a14:useLocalDpi xmlns:a14="http://schemas.microsoft.com/office/drawing/2010/main" val="0"/>
+              </a:ext>
+            </a:extLst>
+          </a:blip>
+          <a:stretch>
+            <a:fillRect/>
+          </a:stretch>
+        </p:blipFill>
+        <p:spPr>
+          <a:xfrm>
+            <a:off x="6869238" y="448667"/>
+            <a:ext cx="1653268" cy="1304087"/>
+          </a:xfrm>
+          <a:prstGeom prst="rect">
+            <a:avLst/>
+          </a:prstGeom>
+        </p:spPr>
+      </p:pic>
+      <p:pic>
+        <p:nvPicPr>
+          <p:cNvPr id="13" name="Picture 12">
+            <a:extLst>
+              <a:ext uri="{FF2B5EF4-FFF2-40B4-BE49-F238E27FC236}">
+                <a16:creationId xmlns:a16="http://schemas.microsoft.com/office/drawing/2014/main" id="{9D288473-489E-4E0A-AEF0-AA4E258EBB26}"/>
+              </a:ext>
+            </a:extLst>
+          </p:cNvPr>
+          <p:cNvPicPr>
+            <a:picLocks noChangeAspect="1"/>
+          </p:cNvPicPr>
+          <p:nvPr/>
+        </p:nvPicPr>
+        <p:blipFill>
+          <a:blip r:embed="rId3">
+            <a:extLst>
+              <a:ext uri="{28A0092B-C50C-407E-A947-70E740481C1C}">
+                <a14:useLocalDpi xmlns:a14="http://schemas.microsoft.com/office/drawing/2010/main" val="0"/>
+              </a:ext>
+            </a:extLst>
+          </a:blip>
+          <a:stretch>
+            <a:fillRect/>
+          </a:stretch>
+        </p:blipFill>
+        <p:spPr>
+          <a:xfrm rot="3298969">
+            <a:off x="4572003" y="2048374"/>
+            <a:ext cx="3048000" cy="1304925"/>
+          </a:xfrm>
+          <a:prstGeom prst="rect">
+            <a:avLst/>
+          </a:prstGeom>
+        </p:spPr>
+      </p:pic>
+      <p:sp>
+        <p:nvSpPr>
+          <p:cNvPr id="14" name="TextBox 13">
+            <a:extLst>
+              <a:ext uri="{FF2B5EF4-FFF2-40B4-BE49-F238E27FC236}">
+                <a16:creationId xmlns:a16="http://schemas.microsoft.com/office/drawing/2014/main" id="{937CD574-BB9D-4363-AFBF-14F818C34F79}"/>
+              </a:ext>
+            </a:extLst>
+          </p:cNvPr>
+          <p:cNvSpPr txBox="1"/>
+          <p:nvPr/>
+        </p:nvSpPr>
+        <p:spPr>
+          <a:xfrm>
+            <a:off x="5113714" y="693592"/>
+            <a:ext cx="2548121" cy="769441"/>
+          </a:xfrm>
+          <a:prstGeom prst="rect">
+            <a:avLst/>
+          </a:prstGeom>
+          <a:noFill/>
+        </p:spPr>
+        <p:txBody>
+          <a:bodyPr wrap="square" rtlCol="0">
+            <a:spAutoFit/>
+          </a:bodyPr>
+          <a:lstStyle/>
+          <a:p>
+            <a:r>
+              <a:rPr lang="en-US" sz="4400" dirty="0">
+                <a:solidFill>
+                  <a:schemeClr val="bg1"/>
+                </a:solidFill>
+              </a:rPr>
+              <a:t>time for</a:t>
+            </a:r>
+            <a:endParaRPr lang="en-NL" sz="4400" dirty="0">
+              <a:solidFill>
+                <a:schemeClr val="bg1"/>
+              </a:solidFill>
+            </a:endParaRPr>
+          </a:p>
+        </p:txBody>
+      </p:sp>
+      <p:sp>
+        <p:nvSpPr>
+          <p:cNvPr id="15" name="TextBox 14">
+            <a:extLst>
+              <a:ext uri="{FF2B5EF4-FFF2-40B4-BE49-F238E27FC236}">
+                <a16:creationId xmlns:a16="http://schemas.microsoft.com/office/drawing/2014/main" id="{13835B82-684B-4753-84E7-5B578143477D}"/>
+              </a:ext>
+            </a:extLst>
+          </p:cNvPr>
+          <p:cNvSpPr txBox="1"/>
+          <p:nvPr/>
+        </p:nvSpPr>
+        <p:spPr>
+          <a:xfrm>
+            <a:off x="3630291" y="1850402"/>
+            <a:ext cx="1956121" cy="769441"/>
+          </a:xfrm>
+          <a:prstGeom prst="rect">
+            <a:avLst/>
+          </a:prstGeom>
+          <a:noFill/>
+        </p:spPr>
+        <p:txBody>
+          <a:bodyPr wrap="square" rtlCol="0">
+            <a:spAutoFit/>
+          </a:bodyPr>
+          <a:lstStyle/>
+          <a:p>
+            <a:r>
+              <a:rPr lang="en-US" sz="4400" dirty="0">
+                <a:solidFill>
+                  <a:schemeClr val="bg1"/>
+                </a:solidFill>
+              </a:rPr>
+              <a:t>back in </a:t>
+            </a:r>
+            <a:endParaRPr lang="en-NL" sz="4400" dirty="0">
+              <a:solidFill>
+                <a:schemeClr val="bg1"/>
+              </a:solidFill>
+            </a:endParaRPr>
+          </a:p>
+        </p:txBody>
+      </p:sp>
+    </p:spTree>
+    <p:extLst>
+      <p:ext uri="{BB962C8B-B14F-4D97-AF65-F5344CB8AC3E}">
+        <p14:creationId xmlns:p14="http://schemas.microsoft.com/office/powerpoint/2010/main" val="2237863484"/>
+      </p:ext>
+    </p:extLst>
+  </p:cSld>
+  <p:clrMapOvr>
+    <a:masterClrMapping/>
+  </p:clrMapOvr>
+</p:sld>
+</file>
+
+<file path=ppt/slides/slide3.xml><?xml version="1.0" encoding="utf-8"?>
+<p:sld xmlns:a="http://schemas.openxmlformats.org/drawingml/2006/main" xmlns:r="http://schemas.openxmlformats.org/officeDocument/2006/relationships" xmlns:p="http://schemas.openxmlformats.org/presentationml/2006/main">
+  <p:cSld>
+    <p:bg>
+      <p:bgPr>
+        <a:solidFill>
+          <a:schemeClr val="tx1"/>
+        </a:solidFill>
+        <a:effectLst/>
+      </p:bgPr>
+    </p:bg>
+    <p:spTree>
+      <p:nvGrpSpPr>
+        <p:cNvPr id="1" name=""/>
+        <p:cNvGrpSpPr/>
+        <p:nvPr/>
+      </p:nvGrpSpPr>
+      <p:grpSpPr>
+        <a:xfrm>
+          <a:off x="0" y="0"/>
+          <a:ext cx="0" cy="0"/>
+          <a:chOff x="0" y="0"/>
+          <a:chExt cx="0" cy="0"/>
+        </a:xfrm>
+      </p:grpSpPr>
+      <p:pic>
+        <p:nvPicPr>
+          <p:cNvPr id="13" name="Picture 12">
+            <a:extLst>
+              <a:ext uri="{FF2B5EF4-FFF2-40B4-BE49-F238E27FC236}">
+                <a16:creationId xmlns:a16="http://schemas.microsoft.com/office/drawing/2014/main" id="{9D288473-489E-4E0A-AEF0-AA4E258EBB26}"/>
+              </a:ext>
+            </a:extLst>
+          </p:cNvPr>
+          <p:cNvPicPr>
+            <a:picLocks noChangeAspect="1"/>
+          </p:cNvPicPr>
+          <p:nvPr/>
+        </p:nvPicPr>
+        <p:blipFill>
+          <a:blip r:embed="rId2">
+            <a:extLst>
+              <a:ext uri="{28A0092B-C50C-407E-A947-70E740481C1C}">
+                <a14:useLocalDpi xmlns:a14="http://schemas.microsoft.com/office/drawing/2010/main" val="0"/>
+              </a:ext>
+            </a:extLst>
+          </a:blip>
+          <a:stretch>
+            <a:fillRect/>
+          </a:stretch>
+        </p:blipFill>
+        <p:spPr>
+          <a:xfrm rot="3298969">
+            <a:off x="4572003" y="2048374"/>
+            <a:ext cx="3048000" cy="1304925"/>
+          </a:xfrm>
+          <a:prstGeom prst="rect">
+            <a:avLst/>
+          </a:prstGeom>
+        </p:spPr>
+      </p:pic>
+      <p:sp>
+        <p:nvSpPr>
+          <p:cNvPr id="14" name="TextBox 13">
+            <a:extLst>
+              <a:ext uri="{FF2B5EF4-FFF2-40B4-BE49-F238E27FC236}">
+                <a16:creationId xmlns:a16="http://schemas.microsoft.com/office/drawing/2014/main" id="{937CD574-BB9D-4363-AFBF-14F818C34F79}"/>
+              </a:ext>
+            </a:extLst>
+          </p:cNvPr>
+          <p:cNvSpPr txBox="1"/>
+          <p:nvPr/>
+        </p:nvSpPr>
+        <p:spPr>
+          <a:xfrm>
+            <a:off x="4453618" y="693592"/>
+            <a:ext cx="2730953" cy="769441"/>
+          </a:xfrm>
+          <a:prstGeom prst="rect">
+            <a:avLst/>
+          </a:prstGeom>
+          <a:noFill/>
+        </p:spPr>
+        <p:txBody>
+          <a:bodyPr wrap="square" rtlCol="0">
+            <a:spAutoFit/>
+          </a:bodyPr>
+          <a:lstStyle/>
+          <a:p>
+            <a:r>
+              <a:rPr lang="en-US" sz="4400" dirty="0">
+                <a:solidFill>
+                  <a:schemeClr val="bg1"/>
+                </a:solidFill>
+              </a:rPr>
+              <a:t>Hands-on</a:t>
+            </a:r>
+            <a:endParaRPr lang="en-NL" sz="4400" dirty="0">
+              <a:solidFill>
+                <a:schemeClr val="bg1"/>
+              </a:solidFill>
+            </a:endParaRPr>
+          </a:p>
+        </p:txBody>
+      </p:sp>
+      <p:sp>
+        <p:nvSpPr>
+          <p:cNvPr id="15" name="TextBox 14">
+            <a:extLst>
+              <a:ext uri="{FF2B5EF4-FFF2-40B4-BE49-F238E27FC236}">
+                <a16:creationId xmlns:a16="http://schemas.microsoft.com/office/drawing/2014/main" id="{13835B82-684B-4753-84E7-5B578143477D}"/>
+              </a:ext>
+            </a:extLst>
+          </p:cNvPr>
+          <p:cNvSpPr txBox="1"/>
+          <p:nvPr/>
+        </p:nvSpPr>
+        <p:spPr>
+          <a:xfrm>
+            <a:off x="2106384" y="1850402"/>
+            <a:ext cx="3453493" cy="707886"/>
+          </a:xfrm>
+          <a:prstGeom prst="rect">
+            <a:avLst/>
+          </a:prstGeom>
+          <a:noFill/>
+        </p:spPr>
+        <p:txBody>
+          <a:bodyPr wrap="square" rtlCol="0">
+            <a:spAutoFit/>
+          </a:bodyPr>
+          <a:lstStyle/>
+          <a:p>
+            <a:r>
+              <a:rPr lang="en-US" sz="4000" dirty="0">
+                <a:solidFill>
+                  <a:schemeClr val="bg1"/>
+                </a:solidFill>
+              </a:rPr>
+              <a:t>time remaining</a:t>
+            </a:r>
+            <a:endParaRPr lang="en-NL" sz="4000" dirty="0">
+              <a:solidFill>
+                <a:schemeClr val="bg1"/>
+              </a:solidFill>
+            </a:endParaRPr>
+          </a:p>
+        </p:txBody>
+      </p:sp>
+      <p:pic>
+        <p:nvPicPr>
+          <p:cNvPr id="3" name="Graphic 2" descr="Spinning Plates with solid fill">
+            <a:extLst>
+              <a:ext uri="{FF2B5EF4-FFF2-40B4-BE49-F238E27FC236}">
+                <a16:creationId xmlns:a16="http://schemas.microsoft.com/office/drawing/2014/main" id="{C1377690-0FFF-8ED8-5624-53E193D4BFA9}"/>
+              </a:ext>
+            </a:extLst>
+          </p:cNvPr>
+          <p:cNvPicPr>
+            <a:picLocks noChangeAspect="1"/>
+          </p:cNvPicPr>
+          <p:nvPr/>
+        </p:nvPicPr>
+        <p:blipFill>
+          <a:blip r:embed="rId3">
+            <a:extLst>
+              <a:ext uri="{28A0092B-C50C-407E-A947-70E740481C1C}">
+                <a14:useLocalDpi xmlns:a14="http://schemas.microsoft.com/office/drawing/2010/main" val="0"/>
+              </a:ext>
+              <a:ext uri="{96DAC541-7B7A-43D3-8B79-37D633B846F1}">
+                <asvg:svgBlip xmlns:asvg="http://schemas.microsoft.com/office/drawing/2016/SVG/main" r:embed="rId4"/>
+              </a:ext>
+            </a:extLst>
+          </a:blip>
+          <a:stretch>
+            <a:fillRect/>
+          </a:stretch>
+        </p:blipFill>
+        <p:spPr>
+          <a:xfrm>
+            <a:off x="7098499" y="448667"/>
+            <a:ext cx="1204493" cy="1204493"/>
+          </a:xfrm>
+          <a:prstGeom prst="rect">
+            <a:avLst/>
+          </a:prstGeom>
+        </p:spPr>
+      </p:pic>
+    </p:spTree>
+    <p:extLst>
+      <p:ext uri="{BB962C8B-B14F-4D97-AF65-F5344CB8AC3E}">
+        <p14:creationId xmlns:p14="http://schemas.microsoft.com/office/powerpoint/2010/main" val="1187092580"/>
+      </p:ext>
+    </p:extLst>
+  </p:cSld>
+  <p:clrMapOvr>
+    <a:masterClrMapping/>
+  </p:clrMapOvr>
+</p:sld>
+</file>
+
 <file path=ppt/theme/theme1.xml><?xml version="1.0" encoding="utf-8"?>
 <a:theme xmlns:a="http://schemas.openxmlformats.org/drawingml/2006/main" name="Office Theme">
   <a:themeElements>

</xml_diff>